<commit_message>
Some updates to slides and metadata.
</commit_message>
<xml_diff>
--- a/2025-03-smartcomponents/Smarte webkomponenter med lokal AI KI.pptx
+++ b/2025-03-smartcomponents/Smarte webkomponenter med lokal AI KI.pptx
@@ -12841,24 +12841,7 @@
           <a:bodyPr/>
           <a:lstStyle/>
           <a:p>
-            <a:r>
-              <a:rPr lang="nb-NO" dirty="0"/>
-              <a:t>On-</a:t>
-            </a:r>
-            <a:r>
-              <a:rPr lang="nb-NO" dirty="0" err="1"/>
-              <a:t>device</a:t>
-            </a:r>
-            <a:r>
-              <a:rPr lang="nb-NO" dirty="0"/>
-              <a:t> AI. Spesialsydde modeller for bruk på for eksempel en telefon eller en klokke.</a:t>
-            </a:r>
-          </a:p>
-          <a:p>
-            <a:r>
-              <a:rPr lang="nb-NO" dirty="0"/>
-              <a:t>Kundesupport bot. Spesielt opplært for å svare på en bestemt mengde spørsmål.</a:t>
-            </a:r>
+            <a:endParaRPr lang="nb-NO" dirty="0"/>
           </a:p>
         </p:txBody>
       </p:sp>
@@ -12942,24 +12925,7 @@
           <a:bodyPr/>
           <a:lstStyle/>
           <a:p>
-            <a:r>
-              <a:rPr lang="nb-NO" dirty="0"/>
-              <a:t>Bruker Mistral 7B.</a:t>
-            </a:r>
-          </a:p>
-          <a:p>
-            <a:r>
-              <a:rPr lang="nb-NO" dirty="0"/>
-              <a:t>Har prøvd </a:t>
-            </a:r>
-            <a:r>
-              <a:rPr lang="nb-NO" dirty="0" err="1"/>
-              <a:t>Codestral</a:t>
-            </a:r>
-            <a:r>
-              <a:rPr lang="nb-NO" dirty="0"/>
-              <a:t> 12B, treig.</a:t>
-            </a:r>
+            <a:endParaRPr lang="nb-NO" dirty="0"/>
           </a:p>
         </p:txBody>
       </p:sp>

</xml_diff>